<commit_message>
Stage Engine Linkage (Step1)
</commit_message>
<xml_diff>
--- a/TonoJit/@Doc/Jit Model Class Design.pptx
+++ b/TonoJit/@Doc/Jit Model Class Design.pptx
@@ -259,7 +259,7 @@
           <a:p>
             <a:fld id="{2A76511F-EB6F-49BF-8568-06D4416883FE}" type="datetimeFigureOut">
               <a:rPr kumimoji="1" lang="ja-JP" altLang="en-US" smtClean="0"/>
-              <a:t>2020/1/30</a:t>
+              <a:t>2020/2/5</a:t>
             </a:fld>
             <a:endParaRPr kumimoji="1" lang="ja-JP" altLang="en-US"/>
           </a:p>
@@ -489,7 +489,7 @@
           <a:p>
             <a:fld id="{2A76511F-EB6F-49BF-8568-06D4416883FE}" type="datetimeFigureOut">
               <a:rPr kumimoji="1" lang="ja-JP" altLang="en-US" smtClean="0"/>
-              <a:t>2020/1/30</a:t>
+              <a:t>2020/2/5</a:t>
             </a:fld>
             <a:endParaRPr kumimoji="1" lang="ja-JP" altLang="en-US"/>
           </a:p>
@@ -729,7 +729,7 @@
           <a:p>
             <a:fld id="{2A76511F-EB6F-49BF-8568-06D4416883FE}" type="datetimeFigureOut">
               <a:rPr kumimoji="1" lang="ja-JP" altLang="en-US" smtClean="0"/>
-              <a:t>2020/1/30</a:t>
+              <a:t>2020/2/5</a:t>
             </a:fld>
             <a:endParaRPr kumimoji="1" lang="ja-JP" altLang="en-US"/>
           </a:p>
@@ -959,7 +959,7 @@
           <a:p>
             <a:fld id="{2A76511F-EB6F-49BF-8568-06D4416883FE}" type="datetimeFigureOut">
               <a:rPr kumimoji="1" lang="ja-JP" altLang="en-US" smtClean="0"/>
-              <a:t>2020/1/30</a:t>
+              <a:t>2020/2/5</a:t>
             </a:fld>
             <a:endParaRPr kumimoji="1" lang="ja-JP" altLang="en-US"/>
           </a:p>
@@ -1234,7 +1234,7 @@
           <a:p>
             <a:fld id="{2A76511F-EB6F-49BF-8568-06D4416883FE}" type="datetimeFigureOut">
               <a:rPr kumimoji="1" lang="ja-JP" altLang="en-US" smtClean="0"/>
-              <a:t>2020/1/30</a:t>
+              <a:t>2020/2/5</a:t>
             </a:fld>
             <a:endParaRPr kumimoji="1" lang="ja-JP" altLang="en-US"/>
           </a:p>
@@ -1563,7 +1563,7 @@
           <a:p>
             <a:fld id="{2A76511F-EB6F-49BF-8568-06D4416883FE}" type="datetimeFigureOut">
               <a:rPr kumimoji="1" lang="ja-JP" altLang="en-US" smtClean="0"/>
-              <a:t>2020/1/30</a:t>
+              <a:t>2020/2/5</a:t>
             </a:fld>
             <a:endParaRPr kumimoji="1" lang="ja-JP" altLang="en-US"/>
           </a:p>
@@ -2039,7 +2039,7 @@
           <a:p>
             <a:fld id="{2A76511F-EB6F-49BF-8568-06D4416883FE}" type="datetimeFigureOut">
               <a:rPr kumimoji="1" lang="ja-JP" altLang="en-US" smtClean="0"/>
-              <a:t>2020/1/30</a:t>
+              <a:t>2020/2/5</a:t>
             </a:fld>
             <a:endParaRPr kumimoji="1" lang="ja-JP" altLang="en-US"/>
           </a:p>
@@ -2180,7 +2180,7 @@
           <a:p>
             <a:fld id="{2A76511F-EB6F-49BF-8568-06D4416883FE}" type="datetimeFigureOut">
               <a:rPr kumimoji="1" lang="ja-JP" altLang="en-US" smtClean="0"/>
-              <a:t>2020/1/30</a:t>
+              <a:t>2020/2/5</a:t>
             </a:fld>
             <a:endParaRPr kumimoji="1" lang="ja-JP" altLang="en-US"/>
           </a:p>
@@ -2293,7 +2293,7 @@
           <a:p>
             <a:fld id="{2A76511F-EB6F-49BF-8568-06D4416883FE}" type="datetimeFigureOut">
               <a:rPr kumimoji="1" lang="ja-JP" altLang="en-US" smtClean="0"/>
-              <a:t>2020/1/30</a:t>
+              <a:t>2020/2/5</a:t>
             </a:fld>
             <a:endParaRPr kumimoji="1" lang="ja-JP" altLang="en-US"/>
           </a:p>
@@ -2636,7 +2636,7 @@
           <a:p>
             <a:fld id="{2A76511F-EB6F-49BF-8568-06D4416883FE}" type="datetimeFigureOut">
               <a:rPr kumimoji="1" lang="ja-JP" altLang="en-US" smtClean="0"/>
-              <a:t>2020/1/30</a:t>
+              <a:t>2020/2/5</a:t>
             </a:fld>
             <a:endParaRPr kumimoji="1" lang="ja-JP" altLang="en-US"/>
           </a:p>
@@ -2924,7 +2924,7 @@
           <a:p>
             <a:fld id="{2A76511F-EB6F-49BF-8568-06D4416883FE}" type="datetimeFigureOut">
               <a:rPr kumimoji="1" lang="ja-JP" altLang="en-US" smtClean="0"/>
-              <a:t>2020/1/30</a:t>
+              <a:t>2020/2/5</a:t>
             </a:fld>
             <a:endParaRPr kumimoji="1" lang="ja-JP" altLang="en-US"/>
           </a:p>
@@ -3197,7 +3197,7 @@
           <a:p>
             <a:fld id="{2A76511F-EB6F-49BF-8568-06D4416883FE}" type="datetimeFigureOut">
               <a:rPr kumimoji="1" lang="ja-JP" altLang="en-US" smtClean="0"/>
-              <a:t>2020/1/30</a:t>
+              <a:t>2020/2/5</a:t>
             </a:fld>
             <a:endParaRPr kumimoji="1" lang="ja-JP" altLang="en-US"/>
           </a:p>
@@ -4193,7 +4193,27 @@
                   </a:schemeClr>
                 </a:solidFill>
               </a:rPr>
-              <a:t>Stage</a:t>
+              <a:t>StageSubset</a:t>
+            </a:r>
+            <a:r>
+              <a:rPr kumimoji="1" lang="ja-JP" altLang="en-US" b="1" u="sng">
+                <a:solidFill>
+                  <a:schemeClr val="accent4">
+                    <a:lumMod val="75000"/>
+                  </a:schemeClr>
+                </a:solidFill>
+              </a:rPr>
+              <a:t>：</a:t>
+            </a:r>
+            <a:r>
+              <a:rPr kumimoji="1" lang="en-US" altLang="ja-JP" b="1" u="sng">
+                <a:solidFill>
+                  <a:schemeClr val="accent4">
+                    <a:lumMod val="75000"/>
+                  </a:schemeClr>
+                </a:solidFill>
+              </a:rPr>
+              <a:t>X</a:t>
             </a:r>
           </a:p>
         </p:txBody>

</xml_diff>